<commit_message>
renamed 'lut.md' module to 'display_settings.md'
</commit_message>
<xml_diff>
--- a/figures/resources/lut.pptx
+++ b/figures/resources/lut.pptx
@@ -199,7 +199,7 @@
           <a:p>
             <a:fld id="{2E6BD66F-E326-B349-8911-9CEB3346DCEC}" type="datetimeFigureOut">
               <a:rPr lang="de-DE" smtClean="0"/>
-              <a:t>11.02.2026</a:t>
+              <a:t>17.02.2026</a:t>
             </a:fld>
             <a:endParaRPr lang="de-DE"/>
           </a:p>
@@ -725,7 +725,7 @@
           <a:p>
             <a:fld id="{2D97518A-9C42-7B47-83BE-724D8D9BB307}" type="datetimeFigureOut">
               <a:rPr lang="de-DE" smtClean="0"/>
-              <a:t>11.02.2026</a:t>
+              <a:t>17.02.2026</a:t>
             </a:fld>
             <a:endParaRPr lang="de-DE"/>
           </a:p>
@@ -925,7 +925,7 @@
           <a:p>
             <a:fld id="{2D97518A-9C42-7B47-83BE-724D8D9BB307}" type="datetimeFigureOut">
               <a:rPr lang="de-DE" smtClean="0"/>
-              <a:t>11.02.2026</a:t>
+              <a:t>17.02.2026</a:t>
             </a:fld>
             <a:endParaRPr lang="de-DE"/>
           </a:p>
@@ -1135,7 +1135,7 @@
           <a:p>
             <a:fld id="{2D97518A-9C42-7B47-83BE-724D8D9BB307}" type="datetimeFigureOut">
               <a:rPr lang="de-DE" smtClean="0"/>
-              <a:t>11.02.2026</a:t>
+              <a:t>17.02.2026</a:t>
             </a:fld>
             <a:endParaRPr lang="de-DE"/>
           </a:p>
@@ -1945,7 +1945,7 @@
           <a:p>
             <a:fld id="{2D97518A-9C42-7B47-83BE-724D8D9BB307}" type="datetimeFigureOut">
               <a:rPr lang="de-DE" smtClean="0"/>
-              <a:t>11.02.2026</a:t>
+              <a:t>17.02.2026</a:t>
             </a:fld>
             <a:endParaRPr lang="de-DE"/>
           </a:p>
@@ -2221,7 +2221,7 @@
           <a:p>
             <a:fld id="{2D97518A-9C42-7B47-83BE-724D8D9BB307}" type="datetimeFigureOut">
               <a:rPr lang="de-DE" smtClean="0"/>
-              <a:t>11.02.2026</a:t>
+              <a:t>17.02.2026</a:t>
             </a:fld>
             <a:endParaRPr lang="de-DE"/>
           </a:p>
@@ -2489,7 +2489,7 @@
           <a:p>
             <a:fld id="{2D97518A-9C42-7B47-83BE-724D8D9BB307}" type="datetimeFigureOut">
               <a:rPr lang="de-DE" smtClean="0"/>
-              <a:t>11.02.2026</a:t>
+              <a:t>17.02.2026</a:t>
             </a:fld>
             <a:endParaRPr lang="de-DE"/>
           </a:p>
@@ -2904,7 +2904,7 @@
           <a:p>
             <a:fld id="{2D97518A-9C42-7B47-83BE-724D8D9BB307}" type="datetimeFigureOut">
               <a:rPr lang="de-DE" smtClean="0"/>
-              <a:t>11.02.2026</a:t>
+              <a:t>17.02.2026</a:t>
             </a:fld>
             <a:endParaRPr lang="de-DE"/>
           </a:p>
@@ -3046,7 +3046,7 @@
           <a:p>
             <a:fld id="{2D97518A-9C42-7B47-83BE-724D8D9BB307}" type="datetimeFigureOut">
               <a:rPr lang="de-DE" smtClean="0"/>
-              <a:t>11.02.2026</a:t>
+              <a:t>17.02.2026</a:t>
             </a:fld>
             <a:endParaRPr lang="de-DE"/>
           </a:p>
@@ -3159,7 +3159,7 @@
           <a:p>
             <a:fld id="{2D97518A-9C42-7B47-83BE-724D8D9BB307}" type="datetimeFigureOut">
               <a:rPr lang="de-DE" smtClean="0"/>
-              <a:t>11.02.2026</a:t>
+              <a:t>17.02.2026</a:t>
             </a:fld>
             <a:endParaRPr lang="de-DE"/>
           </a:p>
@@ -3472,7 +3472,7 @@
           <a:p>
             <a:fld id="{2D97518A-9C42-7B47-83BE-724D8D9BB307}" type="datetimeFigureOut">
               <a:rPr lang="de-DE" smtClean="0"/>
-              <a:t>11.02.2026</a:t>
+              <a:t>17.02.2026</a:t>
             </a:fld>
             <a:endParaRPr lang="de-DE"/>
           </a:p>
@@ -3761,7 +3761,7 @@
           <a:p>
             <a:fld id="{2D97518A-9C42-7B47-83BE-724D8D9BB307}" type="datetimeFigureOut">
               <a:rPr lang="de-DE" smtClean="0"/>
-              <a:t>11.02.2026</a:t>
+              <a:t>17.02.2026</a:t>
             </a:fld>
             <a:endParaRPr lang="de-DE"/>
           </a:p>
@@ -4004,7 +4004,7 @@
           <a:p>
             <a:fld id="{2D97518A-9C42-7B47-83BE-724D8D9BB307}" type="datetimeFigureOut">
               <a:rPr lang="de-DE" smtClean="0"/>
-              <a:t>11.02.2026</a:t>
+              <a:t>17.02.2026</a:t>
             </a:fld>
             <a:endParaRPr lang="de-DE"/>
           </a:p>
@@ -4488,216 +4488,117 @@
           <a:chExt cx="0" cy="0"/>
         </a:xfrm>
       </p:grpSpPr>
-      <p:pic>
-        <p:nvPicPr>
-          <p:cNvPr id="7" name="Picture 6">
-            <a:extLst>
-              <a:ext uri="{FF2B5EF4-FFF2-40B4-BE49-F238E27FC236}">
-                <a16:creationId xmlns:a16="http://schemas.microsoft.com/office/drawing/2014/main" id="{A71E82F9-5E82-E246-A872-A97928C8B893}"/>
-              </a:ext>
-            </a:extLst>
-          </p:cNvPr>
-          <p:cNvPicPr>
-            <a:picLocks noChangeAspect="1"/>
-          </p:cNvPicPr>
+      <p:grpSp>
+        <p:nvGrpSpPr>
+          <p:cNvPr id="21" name="Group 20">
+            <a:extLst>
+              <a:ext uri="{FF2B5EF4-FFF2-40B4-BE49-F238E27FC236}">
+                <a16:creationId xmlns:a16="http://schemas.microsoft.com/office/drawing/2014/main" id="{ADE1A8B2-EFF2-1CED-7B98-8DEB10DB9E70}"/>
+              </a:ext>
+            </a:extLst>
+          </p:cNvPr>
+          <p:cNvGrpSpPr/>
           <p:nvPr/>
-        </p:nvPicPr>
-        <p:blipFill>
-          <a:blip r:embed="rId3"/>
-          <a:stretch>
-            <a:fillRect/>
-          </a:stretch>
-        </p:blipFill>
-        <p:spPr>
+        </p:nvGrpSpPr>
+        <p:grpSpPr>
           <a:xfrm>
-            <a:off x="4700334" y="351971"/>
-            <a:ext cx="3441700" cy="3835400"/>
+            <a:off x="2675213" y="2148840"/>
+            <a:ext cx="6769777" cy="2175433"/>
+            <a:chOff x="2675213" y="2531418"/>
+            <a:chExt cx="5691693" cy="1792855"/>
           </a:xfrm>
-          <a:prstGeom prst="rect">
-            <a:avLst/>
-          </a:prstGeom>
-        </p:spPr>
-      </p:pic>
-      <p:pic>
-        <p:nvPicPr>
-          <p:cNvPr id="8" name="Picture 7">
-            <a:extLst>
-              <a:ext uri="{FF2B5EF4-FFF2-40B4-BE49-F238E27FC236}">
-                <a16:creationId xmlns:a16="http://schemas.microsoft.com/office/drawing/2014/main" id="{64BA3EEA-D7F1-B04F-9B77-BC1A7C23B2C9}"/>
-              </a:ext>
-            </a:extLst>
-          </p:cNvPr>
-          <p:cNvPicPr>
-            <a:picLocks noChangeAspect="1"/>
-          </p:cNvPicPr>
-          <p:nvPr/>
-        </p:nvPicPr>
-        <p:blipFill>
-          <a:blip r:embed="rId4"/>
-          <a:stretch>
-            <a:fillRect/>
-          </a:stretch>
-        </p:blipFill>
-        <p:spPr>
-          <a:xfrm>
-            <a:off x="6948913" y="351971"/>
-            <a:ext cx="3441700" cy="3835400"/>
-          </a:xfrm>
-          <a:prstGeom prst="rect">
-            <a:avLst/>
-          </a:prstGeom>
-        </p:spPr>
-      </p:pic>
-      <p:pic>
-        <p:nvPicPr>
-          <p:cNvPr id="9" name="Picture 8">
-            <a:extLst>
-              <a:ext uri="{FF2B5EF4-FFF2-40B4-BE49-F238E27FC236}">
-                <a16:creationId xmlns:a16="http://schemas.microsoft.com/office/drawing/2014/main" id="{209122AA-1C8D-084D-B171-A960075CD7E1}"/>
-              </a:ext>
-            </a:extLst>
-          </p:cNvPr>
-          <p:cNvPicPr>
-            <a:picLocks noChangeAspect="1"/>
-          </p:cNvPicPr>
-          <p:nvPr/>
-        </p:nvPicPr>
-        <p:blipFill>
-          <a:blip r:embed="rId5"/>
-          <a:stretch>
-            <a:fillRect/>
-          </a:stretch>
-        </p:blipFill>
-        <p:spPr>
-          <a:xfrm>
-            <a:off x="4698746" y="2893785"/>
-            <a:ext cx="3441700" cy="3835400"/>
-          </a:xfrm>
-          <a:prstGeom prst="rect">
-            <a:avLst/>
-          </a:prstGeom>
-        </p:spPr>
-      </p:pic>
-      <p:pic>
-        <p:nvPicPr>
-          <p:cNvPr id="10" name="Picture 9">
-            <a:extLst>
-              <a:ext uri="{FF2B5EF4-FFF2-40B4-BE49-F238E27FC236}">
-                <a16:creationId xmlns:a16="http://schemas.microsoft.com/office/drawing/2014/main" id="{E5BB36E2-5B4A-B44A-A385-5DE153F2BE47}"/>
-              </a:ext>
-            </a:extLst>
-          </p:cNvPr>
-          <p:cNvPicPr>
-            <a:picLocks noChangeAspect="1"/>
-          </p:cNvPicPr>
-          <p:nvPr/>
-        </p:nvPicPr>
-        <p:blipFill>
-          <a:blip r:embed="rId6"/>
-          <a:stretch>
-            <a:fillRect/>
-          </a:stretch>
-        </p:blipFill>
-        <p:spPr>
-          <a:xfrm>
-            <a:off x="9223121" y="351971"/>
-            <a:ext cx="3441700" cy="3835400"/>
-          </a:xfrm>
-          <a:prstGeom prst="rect">
-            <a:avLst/>
-          </a:prstGeom>
-        </p:spPr>
-      </p:pic>
-      <p:pic>
-        <p:nvPicPr>
-          <p:cNvPr id="11" name="Picture 10">
-            <a:extLst>
-              <a:ext uri="{FF2B5EF4-FFF2-40B4-BE49-F238E27FC236}">
-                <a16:creationId xmlns:a16="http://schemas.microsoft.com/office/drawing/2014/main" id="{F9F0484C-928F-A541-8692-A585EE42ACEC}"/>
-              </a:ext>
-            </a:extLst>
-          </p:cNvPr>
-          <p:cNvPicPr>
-            <a:picLocks noChangeAspect="1"/>
-          </p:cNvPicPr>
-          <p:nvPr/>
-        </p:nvPicPr>
-        <p:blipFill>
-          <a:blip r:embed="rId7"/>
-          <a:stretch>
-            <a:fillRect/>
-          </a:stretch>
-        </p:blipFill>
-        <p:spPr>
-          <a:xfrm>
-            <a:off x="9223121" y="2893785"/>
-            <a:ext cx="3441700" cy="3835400"/>
-          </a:xfrm>
-          <a:prstGeom prst="rect">
-            <a:avLst/>
-          </a:prstGeom>
-        </p:spPr>
-      </p:pic>
-      <p:pic>
-        <p:nvPicPr>
-          <p:cNvPr id="12" name="Picture 11">
-            <a:extLst>
-              <a:ext uri="{FF2B5EF4-FFF2-40B4-BE49-F238E27FC236}">
-                <a16:creationId xmlns:a16="http://schemas.microsoft.com/office/drawing/2014/main" id="{FD81FAEA-906E-4E42-B1FB-631308F0B3B1}"/>
-              </a:ext>
-            </a:extLst>
-          </p:cNvPr>
-          <p:cNvPicPr>
-            <a:picLocks noChangeAspect="1"/>
-          </p:cNvPicPr>
-          <p:nvPr/>
-        </p:nvPicPr>
-        <p:blipFill>
-          <a:blip r:embed="rId8"/>
-          <a:stretch>
-            <a:fillRect/>
-          </a:stretch>
-        </p:blipFill>
-        <p:spPr>
-          <a:xfrm>
-            <a:off x="6967963" y="2893785"/>
-            <a:ext cx="3441700" cy="3835400"/>
-          </a:xfrm>
-          <a:prstGeom prst="rect">
-            <a:avLst/>
-          </a:prstGeom>
-        </p:spPr>
-      </p:pic>
-      <p:pic>
-        <p:nvPicPr>
-          <p:cNvPr id="3" name="Picture 2">
-            <a:extLst>
-              <a:ext uri="{FF2B5EF4-FFF2-40B4-BE49-F238E27FC236}">
-                <a16:creationId xmlns:a16="http://schemas.microsoft.com/office/drawing/2014/main" id="{D27666CF-42AD-46AE-C496-2DACFEAB588F}"/>
-              </a:ext>
-            </a:extLst>
-          </p:cNvPr>
-          <p:cNvPicPr>
-            <a:picLocks noChangeAspect="1"/>
-          </p:cNvPicPr>
-          <p:nvPr/>
-        </p:nvPicPr>
-        <p:blipFill>
-          <a:blip r:embed="rId9"/>
-          <a:stretch>
-            <a:fillRect/>
-          </a:stretch>
-        </p:blipFill>
-        <p:spPr>
-          <a:xfrm>
-            <a:off x="164530" y="825020"/>
-            <a:ext cx="5042452" cy="4966179"/>
-          </a:xfrm>
-          <a:prstGeom prst="rect">
-            <a:avLst/>
-          </a:prstGeom>
-        </p:spPr>
-      </p:pic>
+        </p:grpSpPr>
+        <p:pic>
+          <p:nvPicPr>
+            <p:cNvPr id="16" name="Picture 15">
+              <a:extLst>
+                <a:ext uri="{FF2B5EF4-FFF2-40B4-BE49-F238E27FC236}">
+                  <a16:creationId xmlns:a16="http://schemas.microsoft.com/office/drawing/2014/main" id="{20328780-FADC-461F-A567-6FBA61738E85}"/>
+                </a:ext>
+              </a:extLst>
+            </p:cNvPr>
+            <p:cNvPicPr>
+              <a:picLocks noChangeAspect="1"/>
+            </p:cNvPicPr>
+            <p:nvPr/>
+          </p:nvPicPr>
+          <p:blipFill>
+            <a:blip r:embed="rId3"/>
+            <a:stretch>
+              <a:fillRect/>
+            </a:stretch>
+          </p:blipFill>
+          <p:spPr>
+            <a:xfrm>
+              <a:off x="2675213" y="2531418"/>
+              <a:ext cx="1817246" cy="1792854"/>
+            </a:xfrm>
+            <a:prstGeom prst="rect">
+              <a:avLst/>
+            </a:prstGeom>
+          </p:spPr>
+        </p:pic>
+        <p:pic>
+          <p:nvPicPr>
+            <p:cNvPr id="18" name="Picture 17">
+              <a:extLst>
+                <a:ext uri="{FF2B5EF4-FFF2-40B4-BE49-F238E27FC236}">
+                  <a16:creationId xmlns:a16="http://schemas.microsoft.com/office/drawing/2014/main" id="{DDAD8B2E-9849-97A4-27BA-890BFF096621}"/>
+                </a:ext>
+              </a:extLst>
+            </p:cNvPr>
+            <p:cNvPicPr>
+              <a:picLocks noChangeAspect="1"/>
+            </p:cNvPicPr>
+            <p:nvPr/>
+          </p:nvPicPr>
+          <p:blipFill>
+            <a:blip r:embed="rId4"/>
+            <a:stretch>
+              <a:fillRect/>
+            </a:stretch>
+          </p:blipFill>
+          <p:spPr>
+            <a:xfrm>
+              <a:off x="4616685" y="2531418"/>
+              <a:ext cx="1808748" cy="1792453"/>
+            </a:xfrm>
+            <a:prstGeom prst="rect">
+              <a:avLst/>
+            </a:prstGeom>
+          </p:spPr>
+        </p:pic>
+        <p:pic>
+          <p:nvPicPr>
+            <p:cNvPr id="20" name="Picture 19">
+              <a:extLst>
+                <a:ext uri="{FF2B5EF4-FFF2-40B4-BE49-F238E27FC236}">
+                  <a16:creationId xmlns:a16="http://schemas.microsoft.com/office/drawing/2014/main" id="{DFA2BFF1-A4F9-C15A-5E35-FD286865CDCF}"/>
+                </a:ext>
+              </a:extLst>
+            </p:cNvPr>
+            <p:cNvPicPr>
+              <a:picLocks noChangeAspect="1"/>
+            </p:cNvPicPr>
+            <p:nvPr/>
+          </p:nvPicPr>
+          <p:blipFill>
+            <a:blip r:embed="rId5"/>
+            <a:stretch>
+              <a:fillRect/>
+            </a:stretch>
+          </p:blipFill>
+          <p:spPr>
+            <a:xfrm>
+              <a:off x="6549659" y="2531418"/>
+              <a:ext cx="1817247" cy="1792855"/>
+            </a:xfrm>
+            <a:prstGeom prst="rect">
+              <a:avLst/>
+            </a:prstGeom>
+          </p:spPr>
+        </p:pic>
+      </p:grpSp>
     </p:spTree>
     <p:extLst>
       <p:ext uri="{BB962C8B-B14F-4D97-AF65-F5344CB8AC3E}">

</xml_diff>